<commit_message>
Adjust Sequence Diagram in DG
</commit_message>
<xml_diff>
--- a/docs/diagrams/informationPersonListSequenceDiagram.pptx
+++ b/docs/diagrams/informationPersonListSequenceDiagram.pptx
@@ -4982,6 +4982,51 @@
           </a:fontRef>
         </p:style>
       </p:cxnSp>
+      <p:cxnSp>
+        <p:nvCxnSpPr>
+          <p:cNvPr id="3" name="Straight Arrow Connector 2">
+            <a:extLst>
+              <a:ext uri="{FF2B5EF4-FFF2-40B4-BE49-F238E27FC236}">
+                <a16:creationId xmlns:a16="http://schemas.microsoft.com/office/drawing/2014/main" id="{CB71C05C-687C-A342-FCF5-6E165F9B0237}"/>
+              </a:ext>
+            </a:extLst>
+          </p:cNvPr>
+          <p:cNvCxnSpPr>
+            <a:cxnSpLocks/>
+          </p:cNvCxnSpPr>
+          <p:nvPr/>
+        </p:nvCxnSpPr>
+        <p:spPr>
+          <a:xfrm flipH="1">
+            <a:off x="723900" y="4329720"/>
+            <a:ext cx="1731674" cy="0"/>
+          </a:xfrm>
+          <a:prstGeom prst="straightConnector1">
+            <a:avLst/>
+          </a:prstGeom>
+          <a:ln w="12700">
+            <a:solidFill>
+              <a:schemeClr val="tx1"/>
+            </a:solidFill>
+            <a:prstDash val="lgDash"/>
+            <a:tailEnd type="triangle"/>
+          </a:ln>
+        </p:spPr>
+        <p:style>
+          <a:lnRef idx="1">
+            <a:schemeClr val="accent1"/>
+          </a:lnRef>
+          <a:fillRef idx="0">
+            <a:schemeClr val="accent1"/>
+          </a:fillRef>
+          <a:effectRef idx="0">
+            <a:schemeClr val="accent1"/>
+          </a:effectRef>
+          <a:fontRef idx="minor">
+            <a:schemeClr val="tx1"/>
+          </a:fontRef>
+        </p:style>
+      </p:cxnSp>
     </p:spTree>
     <p:extLst>
       <p:ext uri="{BB962C8B-B14F-4D97-AF65-F5344CB8AC3E}">

</xml_diff>